<commit_message>
-Notes for rotation about different centers
</commit_message>
<xml_diff>
--- a/Swerve Diagrams.pptx
+++ b/Swerve Diagrams.pptx
@@ -9,6 +9,7 @@
     <p:sldId id="257" r:id="rId3"/>
     <p:sldId id="258" r:id="rId4"/>
     <p:sldId id="259" r:id="rId5"/>
+    <p:sldId id="260" r:id="rId6"/>
   </p:sldIdLst>
   <p:sldSz cx="9144000" cy="6858000" type="screen4x3"/>
   <p:notesSz cx="6858000" cy="9144000"/>
@@ -291,7 +292,7 @@
           <a:p>
             <a:fld id="{1C96FA09-0CDD-446F-B2CE-A9C284B40926}" type="datetimeFigureOut">
               <a:rPr lang="en-US" smtClean="0"/>
-              <a:t>04/23/2020</a:t>
+              <a:t>04/30/2020</a:t>
             </a:fld>
             <a:endParaRPr lang="en-US"/>
           </a:p>
@@ -461,7 +462,7 @@
           <a:p>
             <a:fld id="{1C96FA09-0CDD-446F-B2CE-A9C284B40926}" type="datetimeFigureOut">
               <a:rPr lang="en-US" smtClean="0"/>
-              <a:t>04/23/2020</a:t>
+              <a:t>04/30/2020</a:t>
             </a:fld>
             <a:endParaRPr lang="en-US"/>
           </a:p>
@@ -641,7 +642,7 @@
           <a:p>
             <a:fld id="{1C96FA09-0CDD-446F-B2CE-A9C284B40926}" type="datetimeFigureOut">
               <a:rPr lang="en-US" smtClean="0"/>
-              <a:t>04/23/2020</a:t>
+              <a:t>04/30/2020</a:t>
             </a:fld>
             <a:endParaRPr lang="en-US"/>
           </a:p>
@@ -811,7 +812,7 @@
           <a:p>
             <a:fld id="{1C96FA09-0CDD-446F-B2CE-A9C284B40926}" type="datetimeFigureOut">
               <a:rPr lang="en-US" smtClean="0"/>
-              <a:t>04/23/2020</a:t>
+              <a:t>04/30/2020</a:t>
             </a:fld>
             <a:endParaRPr lang="en-US"/>
           </a:p>
@@ -1057,7 +1058,7 @@
           <a:p>
             <a:fld id="{1C96FA09-0CDD-446F-B2CE-A9C284B40926}" type="datetimeFigureOut">
               <a:rPr lang="en-US" smtClean="0"/>
-              <a:t>04/23/2020</a:t>
+              <a:t>04/30/2020</a:t>
             </a:fld>
             <a:endParaRPr lang="en-US"/>
           </a:p>
@@ -1345,7 +1346,7 @@
           <a:p>
             <a:fld id="{1C96FA09-0CDD-446F-B2CE-A9C284B40926}" type="datetimeFigureOut">
               <a:rPr lang="en-US" smtClean="0"/>
-              <a:t>04/23/2020</a:t>
+              <a:t>04/30/2020</a:t>
             </a:fld>
             <a:endParaRPr lang="en-US"/>
           </a:p>
@@ -1767,7 +1768,7 @@
           <a:p>
             <a:fld id="{1C96FA09-0CDD-446F-B2CE-A9C284B40926}" type="datetimeFigureOut">
               <a:rPr lang="en-US" smtClean="0"/>
-              <a:t>04/23/2020</a:t>
+              <a:t>04/30/2020</a:t>
             </a:fld>
             <a:endParaRPr lang="en-US"/>
           </a:p>
@@ -1885,7 +1886,7 @@
           <a:p>
             <a:fld id="{1C96FA09-0CDD-446F-B2CE-A9C284B40926}" type="datetimeFigureOut">
               <a:rPr lang="en-US" smtClean="0"/>
-              <a:t>04/23/2020</a:t>
+              <a:t>04/30/2020</a:t>
             </a:fld>
             <a:endParaRPr lang="en-US"/>
           </a:p>
@@ -1980,7 +1981,7 @@
           <a:p>
             <a:fld id="{1C96FA09-0CDD-446F-B2CE-A9C284B40926}" type="datetimeFigureOut">
               <a:rPr lang="en-US" smtClean="0"/>
-              <a:t>04/23/2020</a:t>
+              <a:t>04/30/2020</a:t>
             </a:fld>
             <a:endParaRPr lang="en-US"/>
           </a:p>
@@ -2257,7 +2258,7 @@
           <a:p>
             <a:fld id="{1C96FA09-0CDD-446F-B2CE-A9C284B40926}" type="datetimeFigureOut">
               <a:rPr lang="en-US" smtClean="0"/>
-              <a:t>04/23/2020</a:t>
+              <a:t>04/30/2020</a:t>
             </a:fld>
             <a:endParaRPr lang="en-US"/>
           </a:p>
@@ -2510,7 +2511,7 @@
           <a:p>
             <a:fld id="{1C96FA09-0CDD-446F-B2CE-A9C284B40926}" type="datetimeFigureOut">
               <a:rPr lang="en-US" smtClean="0"/>
-              <a:t>04/23/2020</a:t>
+              <a:t>04/30/2020</a:t>
             </a:fld>
             <a:endParaRPr lang="en-US"/>
           </a:p>
@@ -2723,7 +2724,7 @@
           <a:p>
             <a:fld id="{1C96FA09-0CDD-446F-B2CE-A9C284B40926}" type="datetimeFigureOut">
               <a:rPr lang="en-US" smtClean="0"/>
-              <a:t>04/23/2020</a:t>
+              <a:t>04/30/2020</a:t>
             </a:fld>
             <a:endParaRPr lang="en-US"/>
           </a:p>
@@ -5043,11 +5044,7 @@
             </a:r>
             <a:r>
               <a:rPr lang="en-US" sz="1200" b="1" dirty="0" smtClean="0"/>
-              <a:t>+</a:t>
-            </a:r>
-            <a:r>
-              <a:rPr lang="en-US" sz="1200" b="1" dirty="0" smtClean="0"/>
-              <a:t> </a:t>
+              <a:t>+ </a:t>
             </a:r>
             <a:r>
               <a:rPr lang="en-US" sz="1200" b="1" dirty="0" err="1" smtClean="0"/>
@@ -5275,8 +5272,8 @@
           </a:p>
         </p:txBody>
       </p:sp>
-      <mc:AlternateContent xmlns:mc="http://schemas.openxmlformats.org/markup-compatibility/2006">
-        <mc:Choice xmlns:a14="http://schemas.microsoft.com/office/drawing/2010/main" Requires="a14">
+      <mc:AlternateContent xmlns:mc="http://schemas.openxmlformats.org/markup-compatibility/2006" xmlns:a14="http://schemas.microsoft.com/office/drawing/2010/main">
+        <mc:Choice Requires="a14">
           <p:sp>
             <p:nvSpPr>
               <p:cNvPr id="61" name="TextBox 60"/>
@@ -5357,10 +5354,11 @@
                       <m:accPr>
                         <m:chr m:val="̂"/>
                         <m:ctrlPr>
-                          <a:rPr lang="en-US" sz="1200" smtClean="0">
+                          <a:rPr lang="en-US" sz="1200" i="1" smtClean="0">
                             <a:solidFill>
                               <a:srgbClr val="00B050"/>
                             </a:solidFill>
+                            <a:latin typeface="Cambria Math"/>
                           </a:rPr>
                         </m:ctrlPr>
                       </m:accPr>
@@ -5380,11 +5378,7 @@
                 </a14:m>
                 <a:r>
                   <a:rPr lang="en-US" sz="1200" dirty="0" smtClean="0"/>
-                  <a:t> </a:t>
-                </a:r>
-                <a:r>
-                  <a:rPr lang="en-US" sz="1200" dirty="0" smtClean="0"/>
-                  <a:t>+ </a:t>
+                  <a:t> + </a:t>
                 </a:r>
                 <a:r>
                   <a:rPr lang="en-US" sz="1200" dirty="0" err="1" smtClean="0"/>
@@ -5400,7 +5394,9 @@
                       <m:accPr>
                         <m:chr m:val="̂"/>
                         <m:ctrlPr>
-                          <a:rPr lang="en-US" sz="1200"/>
+                          <a:rPr lang="en-US" sz="1200" i="1">
+                            <a:latin typeface="Cambria Math"/>
+                          </a:rPr>
                         </m:ctrlPr>
                       </m:accPr>
                       <m:e>
@@ -5422,7 +5418,7 @@
             </p:txBody>
           </p:sp>
         </mc:Choice>
-        <mc:Fallback>
+        <mc:Fallback xmlns="">
           <p:sp>
             <p:nvSpPr>
               <p:cNvPr id="61" name="TextBox 60"/>
@@ -5521,8 +5517,8 @@
           </a:fontRef>
         </p:style>
       </p:cxnSp>
-      <mc:AlternateContent xmlns:mc="http://schemas.openxmlformats.org/markup-compatibility/2006">
-        <mc:Choice xmlns:a14="http://schemas.microsoft.com/office/drawing/2010/main" Requires="a14">
+      <mc:AlternateContent xmlns:mc="http://schemas.openxmlformats.org/markup-compatibility/2006" xmlns:a14="http://schemas.microsoft.com/office/drawing/2010/main">
+        <mc:Choice Requires="a14">
           <p:sp>
             <p:nvSpPr>
               <p:cNvPr id="67" name="Rectangle 66"/>
@@ -5575,7 +5571,7 @@
             </p:txBody>
           </p:sp>
         </mc:Choice>
-        <mc:Fallback>
+        <mc:Fallback xmlns="">
           <p:sp>
             <p:nvSpPr>
               <p:cNvPr id="67" name="Rectangle 66"/>
@@ -5614,8 +5610,8 @@
           </p:sp>
         </mc:Fallback>
       </mc:AlternateContent>
-      <mc:AlternateContent xmlns:mc="http://schemas.openxmlformats.org/markup-compatibility/2006">
-        <mc:Choice xmlns:a14="http://schemas.microsoft.com/office/drawing/2010/main" Requires="a14">
+      <mc:AlternateContent xmlns:mc="http://schemas.openxmlformats.org/markup-compatibility/2006" xmlns:a14="http://schemas.microsoft.com/office/drawing/2010/main">
+        <mc:Choice Requires="a14">
           <p:sp>
             <p:nvSpPr>
               <p:cNvPr id="68" name="Rectangle 67"/>
@@ -5668,7 +5664,7 @@
             </p:txBody>
           </p:sp>
         </mc:Choice>
-        <mc:Fallback>
+        <mc:Fallback xmlns="">
           <p:sp>
             <p:nvSpPr>
               <p:cNvPr id="68" name="Rectangle 67"/>
@@ -5839,8 +5835,8 @@
           </a:p>
         </p:txBody>
       </p:sp>
-      <mc:AlternateContent xmlns:mc="http://schemas.openxmlformats.org/markup-compatibility/2006">
-        <mc:Choice xmlns:a14="http://schemas.microsoft.com/office/drawing/2010/main" Requires="a14">
+      <mc:AlternateContent xmlns:mc="http://schemas.openxmlformats.org/markup-compatibility/2006" xmlns:a14="http://schemas.microsoft.com/office/drawing/2010/main">
+        <mc:Choice Requires="a14">
           <p:sp>
             <p:nvSpPr>
               <p:cNvPr id="79" name="TextBox 78"/>
@@ -5893,11 +5889,7 @@
                 </a:r>
                 <a:r>
                   <a:rPr lang="en-US" sz="1200" b="1" dirty="0" smtClean="0"/>
-                  <a:t>+</a:t>
-                </a:r>
-                <a:r>
-                  <a:rPr lang="en-US" sz="1200" b="1" dirty="0" smtClean="0"/>
-                  <a:t> </a:t>
+                  <a:t>+ </a:t>
                 </a:r>
                 <a:r>
                   <a:rPr lang="en-US" sz="1200" b="1" dirty="0" err="1" smtClean="0"/>
@@ -5916,11 +5908,7 @@
                 </a:r>
                 <a:r>
                   <a:rPr lang="en-US" sz="1200" b="1" baseline="-25000" dirty="0" err="1" smtClean="0"/>
-                  <a:t>w</a:t>
-                </a:r>
-                <a:r>
-                  <a:rPr lang="en-US" sz="1200" b="1" baseline="-25000" dirty="0" err="1" smtClean="0"/>
-                  <a:t>x</a:t>
+                  <a:t>wx</a:t>
                 </a:r>
                 <a:r>
                   <a:rPr lang="en-US" sz="1200" b="1" baseline="-25000" dirty="0" smtClean="0"/>
@@ -6095,11 +6083,7 @@
                 </a:r>
                 <a:r>
                   <a:rPr lang="en-US" sz="1200" b="1" dirty="0" smtClean="0"/>
-                  <a:t> </a:t>
-                </a:r>
-                <a:r>
-                  <a:rPr lang="en-US" sz="1200" b="1" dirty="0" smtClean="0"/>
-                  <a:t>+ </a:t>
+                  <a:t> + </a:t>
                 </a:r>
                 <a:r>
                   <a:rPr lang="en-US" sz="1200" b="1" dirty="0" err="1" smtClean="0"/>
@@ -6260,7 +6244,7 @@
             </p:txBody>
           </p:sp>
         </mc:Choice>
-        <mc:Fallback>
+        <mc:Fallback xmlns="">
           <p:sp>
             <p:nvSpPr>
               <p:cNvPr id="79" name="TextBox 78"/>
@@ -6422,7 +6406,7 @@
         </p:nvSpPr>
         <p:spPr>
           <a:xfrm>
-            <a:off x="2693163" y="4067945"/>
+            <a:off x="2678695" y="4015353"/>
             <a:ext cx="208224" cy="209673"/>
           </a:xfrm>
           <a:prstGeom prst="ellipse">
@@ -6563,8 +6547,8 @@
           </a:p>
         </p:txBody>
       </p:sp>
-      <mc:AlternateContent xmlns:mc="http://schemas.openxmlformats.org/markup-compatibility/2006">
-        <mc:Choice xmlns:a14="http://schemas.microsoft.com/office/drawing/2010/main" Requires="a14">
+      <mc:AlternateContent xmlns:mc="http://schemas.openxmlformats.org/markup-compatibility/2006" xmlns:a14="http://schemas.microsoft.com/office/drawing/2010/main">
+        <mc:Choice Requires="a14">
           <p:sp>
             <p:nvSpPr>
               <p:cNvPr id="96" name="Rectangle 95"/>
@@ -6586,6 +6570,7 @@
               </a:bodyPr>
               <a:lstStyle/>
               <a:p>
+                <a:pPr/>
                 <a14:m>
                   <m:oMathPara xmlns:m="http://schemas.openxmlformats.org/officeDocument/2006/math">
                     <m:oMathParaPr>
@@ -6597,6 +6582,7 @@
                           <a:solidFill>
                             <a:srgbClr val="FFC000"/>
                           </a:solidFill>
+                          <a:latin typeface="Cambria Math"/>
                         </a:rPr>
                         <m:t>𝜔</m:t>
                       </m:r>
@@ -6612,7 +6598,7 @@
             </p:txBody>
           </p:sp>
         </mc:Choice>
-        <mc:Fallback>
+        <mc:Fallback xmlns="">
           <p:sp>
             <p:nvSpPr>
               <p:cNvPr id="96" name="Rectangle 95"/>
@@ -7284,8 +7270,8 @@
           </a:p>
         </p:txBody>
       </p:sp>
-      <mc:AlternateContent xmlns:mc="http://schemas.openxmlformats.org/markup-compatibility/2006">
-        <mc:Choice xmlns:a14="http://schemas.microsoft.com/office/drawing/2010/main" Requires="a14">
+      <mc:AlternateContent xmlns:mc="http://schemas.openxmlformats.org/markup-compatibility/2006" xmlns:a14="http://schemas.microsoft.com/office/drawing/2010/main">
+        <mc:Choice Requires="a14">
           <p:sp>
             <p:nvSpPr>
               <p:cNvPr id="45" name="Rectangle 44"/>
@@ -7307,6 +7293,7 @@
               </a:bodyPr>
               <a:lstStyle/>
               <a:p>
+                <a:pPr/>
                 <a14:m>
                   <m:oMathPara xmlns:m="http://schemas.openxmlformats.org/officeDocument/2006/math">
                     <m:oMathParaPr>
@@ -7318,6 +7305,7 @@
                           <a:solidFill>
                             <a:srgbClr val="FFC000"/>
                           </a:solidFill>
+                          <a:latin typeface="Cambria Math"/>
                         </a:rPr>
                         <m:t>𝜔</m:t>
                       </m:r>
@@ -7333,7 +7321,7 @@
             </p:txBody>
           </p:sp>
         </mc:Choice>
-        <mc:Fallback>
+        <mc:Fallback xmlns="">
           <p:sp>
             <p:nvSpPr>
               <p:cNvPr id="45" name="Rectangle 44"/>
@@ -8089,8 +8077,8 @@
           </a:p>
         </p:txBody>
       </p:sp>
-      <mc:AlternateContent xmlns:mc="http://schemas.openxmlformats.org/markup-compatibility/2006">
-        <mc:Choice xmlns:a14="http://schemas.microsoft.com/office/drawing/2010/main" Requires="a14">
+      <mc:AlternateContent xmlns:mc="http://schemas.openxmlformats.org/markup-compatibility/2006" xmlns:a14="http://schemas.microsoft.com/office/drawing/2010/main">
+        <mc:Choice Requires="a14">
           <p:sp>
             <p:nvSpPr>
               <p:cNvPr id="21" name="Rectangle 20"/>
@@ -8119,6 +8107,7 @@
                         <a:solidFill>
                           <a:srgbClr val="FFC000"/>
                         </a:solidFill>
+                        <a:latin typeface="Cambria Math"/>
                       </a:rPr>
                       <m:t>𝜔</m:t>
                     </m:r>
@@ -8198,7 +8187,7 @@
             </p:txBody>
           </p:sp>
         </mc:Choice>
-        <mc:Fallback>
+        <mc:Fallback xmlns="">
           <p:sp>
             <p:nvSpPr>
               <p:cNvPr id="21" name="Rectangle 20"/>
@@ -8237,8 +8226,8 @@
           </p:sp>
         </mc:Fallback>
       </mc:AlternateContent>
-      <mc:AlternateContent xmlns:mc="http://schemas.openxmlformats.org/markup-compatibility/2006">
-        <mc:Choice xmlns:a14="http://schemas.microsoft.com/office/drawing/2010/main" Requires="a14">
+      <mc:AlternateContent xmlns:mc="http://schemas.openxmlformats.org/markup-compatibility/2006" xmlns:a14="http://schemas.microsoft.com/office/drawing/2010/main">
+        <mc:Choice Requires="a14">
           <p:sp>
             <p:nvSpPr>
               <p:cNvPr id="22" name="TextBox 21"/>
@@ -8272,11 +8261,7 @@
                 </a:r>
                 <a:r>
                   <a:rPr lang="en-US" sz="1200" baseline="-25000" dirty="0" err="1" smtClean="0"/>
-                  <a:t>w</a:t>
-                </a:r>
-                <a:r>
-                  <a:rPr lang="en-US" sz="1200" baseline="-25000" dirty="0" err="1" smtClean="0"/>
-                  <a:t>x</a:t>
+                  <a:t>wx</a:t>
                 </a:r>
                 <a:r>
                   <a:rPr lang="en-US" sz="1200" b="1" baseline="-25000" dirty="0" smtClean="0"/>
@@ -8428,15 +8413,7 @@
                       <a:schemeClr val="tx1"/>
                     </a:solidFill>
                   </a:rPr>
-                  <a:t>+</a:t>
-                </a:r>
-                <a:r>
-                  <a:rPr lang="en-US" sz="1200" dirty="0" smtClean="0">
-                    <a:solidFill>
-                      <a:schemeClr val="tx1"/>
-                    </a:solidFill>
-                  </a:rPr>
-                  <a:t> </a:t>
+                  <a:t>+ </a:t>
                 </a:r>
                 <a:r>
                   <a:rPr lang="en-US" sz="1200" dirty="0" smtClean="0">
@@ -8710,11 +8687,7 @@
                 </a:r>
                 <a:r>
                   <a:rPr lang="en-US" sz="1200" dirty="0" smtClean="0"/>
-                  <a:t>*</a:t>
-                </a:r>
-                <a:r>
-                  <a:rPr lang="en-US" sz="1200" dirty="0" smtClean="0"/>
-                  <a:t>0.5*</a:t>
+                  <a:t>*0.5*</a:t>
                 </a:r>
                 <a:r>
                   <a:rPr lang="en-US" sz="1200" dirty="0" smtClean="0">
@@ -8798,7 +8771,7 @@
             </p:txBody>
           </p:sp>
         </mc:Choice>
-        <mc:Fallback>
+        <mc:Fallback xmlns="">
           <p:sp>
             <p:nvSpPr>
               <p:cNvPr id="22" name="TextBox 21"/>
@@ -8879,11 +8852,7 @@
             </a:r>
             <a:r>
               <a:rPr lang="en-US" sz="1400" dirty="0" smtClean="0"/>
-              <a:t>(</a:t>
-            </a:r>
-            <a:r>
-              <a:rPr lang="en-US" sz="1400" dirty="0" smtClean="0"/>
-              <a:t>v</a:t>
+              <a:t>(v</a:t>
             </a:r>
             <a:r>
               <a:rPr lang="en-US" sz="1400" baseline="-25000" dirty="0" smtClean="0"/>
@@ -8901,7 +8870,6 @@
               <a:rPr lang="en-US" sz="1400" dirty="0" smtClean="0"/>
               <a:t>^2)</a:t>
             </a:r>
-            <a:endParaRPr lang="en-US" sz="1400" dirty="0" smtClean="0"/>
           </a:p>
           <a:p>
             <a:endParaRPr lang="en-US" sz="1400" dirty="0" smtClean="0"/>
@@ -9289,6 +9257,1121 @@
     <p:extLst>
       <p:ext uri="{BB962C8B-B14F-4D97-AF65-F5344CB8AC3E}">
         <p14:creationId xmlns:p14="http://schemas.microsoft.com/office/powerpoint/2010/main" val="2308537230"/>
+      </p:ext>
+    </p:extLst>
+  </p:cSld>
+  <p:clrMapOvr>
+    <a:masterClrMapping/>
+  </p:clrMapOvr>
+</p:sld>
+</file>
+
+<file path=ppt/slides/slide5.xml><?xml version="1.0" encoding="utf-8"?>
+<p:sld xmlns:a="http://schemas.openxmlformats.org/drawingml/2006/main" xmlns:r="http://schemas.openxmlformats.org/officeDocument/2006/relationships" xmlns:p="http://schemas.openxmlformats.org/presentationml/2006/main">
+  <p:cSld>
+    <p:spTree>
+      <p:nvGrpSpPr>
+        <p:cNvPr id="1" name=""/>
+        <p:cNvGrpSpPr/>
+        <p:nvPr/>
+      </p:nvGrpSpPr>
+      <p:grpSpPr>
+        <a:xfrm>
+          <a:off x="0" y="0"/>
+          <a:ext cx="0" cy="0"/>
+          <a:chOff x="0" y="0"/>
+          <a:chExt cx="0" cy="0"/>
+        </a:xfrm>
+      </p:grpSpPr>
+      <p:sp>
+        <p:nvSpPr>
+          <p:cNvPr id="4" name="Rectangle 3"/>
+          <p:cNvSpPr/>
+          <p:nvPr/>
+        </p:nvSpPr>
+        <p:spPr>
+          <a:xfrm>
+            <a:off x="2057400" y="3124200"/>
+            <a:ext cx="1524000" cy="1573192"/>
+          </a:xfrm>
+          <a:prstGeom prst="rect">
+            <a:avLst/>
+          </a:prstGeom>
+        </p:spPr>
+        <p:style>
+          <a:lnRef idx="2">
+            <a:schemeClr val="accent1">
+              <a:shade val="50000"/>
+            </a:schemeClr>
+          </a:lnRef>
+          <a:fillRef idx="1">
+            <a:schemeClr val="accent1"/>
+          </a:fillRef>
+          <a:effectRef idx="0">
+            <a:schemeClr val="accent1"/>
+          </a:effectRef>
+          <a:fontRef idx="minor">
+            <a:schemeClr val="lt1"/>
+          </a:fontRef>
+        </p:style>
+        <p:txBody>
+          <a:bodyPr rtlCol="0" anchor="ctr"/>
+          <a:lstStyle/>
+          <a:p>
+            <a:pPr algn="ctr"/>
+            <a:endParaRPr lang="en-US" dirty="0"/>
+          </a:p>
+        </p:txBody>
+      </p:sp>
+      <p:sp>
+        <p:nvSpPr>
+          <p:cNvPr id="5" name="Rectangle 4"/>
+          <p:cNvSpPr/>
+          <p:nvPr/>
+        </p:nvSpPr>
+        <p:spPr>
+          <a:xfrm>
+            <a:off x="3505199" y="2933700"/>
+            <a:ext cx="152400" cy="381000"/>
+          </a:xfrm>
+          <a:prstGeom prst="rect">
+            <a:avLst/>
+          </a:prstGeom>
+          <a:solidFill>
+            <a:srgbClr val="FFC000"/>
+          </a:solidFill>
+        </p:spPr>
+        <p:style>
+          <a:lnRef idx="2">
+            <a:schemeClr val="accent1">
+              <a:shade val="50000"/>
+            </a:schemeClr>
+          </a:lnRef>
+          <a:fillRef idx="1">
+            <a:schemeClr val="accent1"/>
+          </a:fillRef>
+          <a:effectRef idx="0">
+            <a:schemeClr val="accent1"/>
+          </a:effectRef>
+          <a:fontRef idx="minor">
+            <a:schemeClr val="lt1"/>
+          </a:fontRef>
+        </p:style>
+        <p:txBody>
+          <a:bodyPr rtlCol="0" anchor="ctr"/>
+          <a:lstStyle/>
+          <a:p>
+            <a:pPr algn="ctr"/>
+            <a:endParaRPr lang="en-US"/>
+          </a:p>
+        </p:txBody>
+      </p:sp>
+      <p:sp>
+        <p:nvSpPr>
+          <p:cNvPr id="9" name="TextBox 8"/>
+          <p:cNvSpPr txBox="1"/>
+          <p:nvPr/>
+        </p:nvSpPr>
+        <p:spPr>
+          <a:xfrm>
+            <a:off x="3214389" y="3200400"/>
+            <a:ext cx="301686" cy="369332"/>
+          </a:xfrm>
+          <a:prstGeom prst="rect">
+            <a:avLst/>
+          </a:prstGeom>
+          <a:noFill/>
+        </p:spPr>
+        <p:txBody>
+          <a:bodyPr wrap="none" rtlCol="0">
+            <a:spAutoFit/>
+          </a:bodyPr>
+          <a:lstStyle/>
+          <a:p>
+            <a:r>
+              <a:rPr lang="en-US" dirty="0" smtClean="0">
+                <a:solidFill>
+                  <a:schemeClr val="bg1"/>
+                </a:solidFill>
+              </a:rPr>
+              <a:t>0</a:t>
+            </a:r>
+            <a:endParaRPr lang="en-US" dirty="0">
+              <a:solidFill>
+                <a:schemeClr val="bg1"/>
+              </a:solidFill>
+            </a:endParaRPr>
+          </a:p>
+        </p:txBody>
+      </p:sp>
+      <p:sp>
+        <p:nvSpPr>
+          <p:cNvPr id="10" name="TextBox 9"/>
+          <p:cNvSpPr txBox="1"/>
+          <p:nvPr/>
+        </p:nvSpPr>
+        <p:spPr>
+          <a:xfrm>
+            <a:off x="2117080" y="3200400"/>
+            <a:ext cx="290811" cy="369332"/>
+          </a:xfrm>
+          <a:prstGeom prst="rect">
+            <a:avLst/>
+          </a:prstGeom>
+          <a:noFill/>
+        </p:spPr>
+        <p:txBody>
+          <a:bodyPr wrap="square" rtlCol="0">
+            <a:spAutoFit/>
+          </a:bodyPr>
+          <a:lstStyle/>
+          <a:p>
+            <a:r>
+              <a:rPr lang="en-US" dirty="0" smtClean="0">
+                <a:solidFill>
+                  <a:schemeClr val="bg1"/>
+                </a:solidFill>
+              </a:rPr>
+              <a:t>1</a:t>
+            </a:r>
+            <a:endParaRPr lang="en-US" dirty="0">
+              <a:solidFill>
+                <a:schemeClr val="bg1"/>
+              </a:solidFill>
+            </a:endParaRPr>
+          </a:p>
+        </p:txBody>
+      </p:sp>
+      <p:sp>
+        <p:nvSpPr>
+          <p:cNvPr id="11" name="TextBox 10"/>
+          <p:cNvSpPr txBox="1"/>
+          <p:nvPr/>
+        </p:nvSpPr>
+        <p:spPr>
+          <a:xfrm>
+            <a:off x="2249679" y="4724400"/>
+            <a:ext cx="301686" cy="369332"/>
+          </a:xfrm>
+          <a:prstGeom prst="rect">
+            <a:avLst/>
+          </a:prstGeom>
+          <a:noFill/>
+        </p:spPr>
+        <p:txBody>
+          <a:bodyPr wrap="none" rtlCol="0">
+            <a:spAutoFit/>
+          </a:bodyPr>
+          <a:lstStyle/>
+          <a:p>
+            <a:r>
+              <a:rPr lang="en-US" dirty="0" smtClean="0">
+                <a:solidFill>
+                  <a:schemeClr val="bg1"/>
+                </a:solidFill>
+              </a:rPr>
+              <a:t>2</a:t>
+            </a:r>
+            <a:endParaRPr lang="en-US" dirty="0">
+              <a:solidFill>
+                <a:schemeClr val="bg1"/>
+              </a:solidFill>
+            </a:endParaRPr>
+          </a:p>
+        </p:txBody>
+      </p:sp>
+      <p:sp>
+        <p:nvSpPr>
+          <p:cNvPr id="12" name="TextBox 11"/>
+          <p:cNvSpPr txBox="1"/>
+          <p:nvPr/>
+        </p:nvSpPr>
+        <p:spPr>
+          <a:xfrm>
+            <a:off x="3155900" y="4697392"/>
+            <a:ext cx="301686" cy="369332"/>
+          </a:xfrm>
+          <a:prstGeom prst="rect">
+            <a:avLst/>
+          </a:prstGeom>
+          <a:noFill/>
+        </p:spPr>
+        <p:txBody>
+          <a:bodyPr wrap="none" rtlCol="0">
+            <a:spAutoFit/>
+          </a:bodyPr>
+          <a:lstStyle/>
+          <a:p>
+            <a:r>
+              <a:rPr lang="en-US" dirty="0" smtClean="0">
+                <a:solidFill>
+                  <a:schemeClr val="bg1"/>
+                </a:solidFill>
+              </a:rPr>
+              <a:t>3</a:t>
+            </a:r>
+            <a:endParaRPr lang="en-US" dirty="0">
+              <a:solidFill>
+                <a:schemeClr val="bg1"/>
+              </a:solidFill>
+            </a:endParaRPr>
+          </a:p>
+        </p:txBody>
+      </p:sp>
+      <p:grpSp>
+        <p:nvGrpSpPr>
+          <p:cNvPr id="2" name="Group 1"/>
+          <p:cNvGrpSpPr/>
+          <p:nvPr/>
+        </p:nvGrpSpPr>
+        <p:grpSpPr>
+          <a:xfrm>
+            <a:off x="1981200" y="2974293"/>
+            <a:ext cx="213672" cy="381000"/>
+            <a:chOff x="1981200" y="2974293"/>
+            <a:chExt cx="213672" cy="381000"/>
+          </a:xfrm>
+        </p:grpSpPr>
+        <p:sp>
+          <p:nvSpPr>
+            <p:cNvPr id="6" name="Rectangle 5"/>
+            <p:cNvSpPr/>
+            <p:nvPr/>
+          </p:nvSpPr>
+          <p:spPr>
+            <a:xfrm rot="2558998">
+              <a:off x="1981200" y="2974293"/>
+              <a:ext cx="152400" cy="381000"/>
+            </a:xfrm>
+            <a:prstGeom prst="rect">
+              <a:avLst/>
+            </a:prstGeom>
+            <a:solidFill>
+              <a:srgbClr val="FFC000"/>
+            </a:solidFill>
+          </p:spPr>
+          <p:style>
+            <a:lnRef idx="2">
+              <a:schemeClr val="accent1">
+                <a:shade val="50000"/>
+              </a:schemeClr>
+            </a:lnRef>
+            <a:fillRef idx="1">
+              <a:schemeClr val="accent1"/>
+            </a:fillRef>
+            <a:effectRef idx="0">
+              <a:schemeClr val="accent1"/>
+            </a:effectRef>
+            <a:fontRef idx="minor">
+              <a:schemeClr val="lt1"/>
+            </a:fontRef>
+          </p:style>
+          <p:txBody>
+            <a:bodyPr rtlCol="0" anchor="ctr"/>
+            <a:lstStyle/>
+            <a:p>
+              <a:pPr algn="ctr"/>
+              <a:endParaRPr lang="en-US"/>
+            </a:p>
+          </p:txBody>
+        </p:sp>
+        <p:cxnSp>
+          <p:nvCxnSpPr>
+            <p:cNvPr id="27" name="Straight Arrow Connector 26"/>
+            <p:cNvCxnSpPr/>
+            <p:nvPr/>
+          </p:nvCxnSpPr>
+          <p:spPr>
+            <a:xfrm flipV="1">
+              <a:off x="2172569" y="2981866"/>
+              <a:ext cx="22303" cy="29420"/>
+            </a:xfrm>
+            <a:prstGeom prst="straightConnector1">
+              <a:avLst/>
+            </a:prstGeom>
+            <a:ln>
+              <a:solidFill>
+                <a:srgbClr val="FF0000"/>
+              </a:solidFill>
+              <a:tailEnd type="arrow"/>
+            </a:ln>
+          </p:spPr>
+          <p:style>
+            <a:lnRef idx="1">
+              <a:schemeClr val="accent1"/>
+            </a:lnRef>
+            <a:fillRef idx="0">
+              <a:schemeClr val="accent1"/>
+            </a:fillRef>
+            <a:effectRef idx="0">
+              <a:schemeClr val="accent1"/>
+            </a:effectRef>
+            <a:fontRef idx="minor">
+              <a:schemeClr val="tx1"/>
+            </a:fontRef>
+          </p:style>
+        </p:cxnSp>
+      </p:grpSp>
+      <p:grpSp>
+        <p:nvGrpSpPr>
+          <p:cNvPr id="13" name="Group 12"/>
+          <p:cNvGrpSpPr/>
+          <p:nvPr/>
+        </p:nvGrpSpPr>
+        <p:grpSpPr>
+          <a:xfrm rot="10563661">
+            <a:off x="3112783" y="4522344"/>
+            <a:ext cx="549376" cy="727877"/>
+            <a:chOff x="3505199" y="4635624"/>
+            <a:chExt cx="549376" cy="727877"/>
+          </a:xfrm>
+        </p:grpSpPr>
+        <p:sp>
+          <p:nvSpPr>
+            <p:cNvPr id="8" name="Rectangle 7"/>
+            <p:cNvSpPr/>
+            <p:nvPr/>
+          </p:nvSpPr>
+          <p:spPr>
+            <a:xfrm rot="2519694">
+              <a:off x="3505199" y="4982501"/>
+              <a:ext cx="152400" cy="381000"/>
+            </a:xfrm>
+            <a:prstGeom prst="rect">
+              <a:avLst/>
+            </a:prstGeom>
+            <a:solidFill>
+              <a:srgbClr val="FFC000"/>
+            </a:solidFill>
+          </p:spPr>
+          <p:style>
+            <a:lnRef idx="2">
+              <a:schemeClr val="accent1">
+                <a:shade val="50000"/>
+              </a:schemeClr>
+            </a:lnRef>
+            <a:fillRef idx="1">
+              <a:schemeClr val="accent1"/>
+            </a:fillRef>
+            <a:effectRef idx="0">
+              <a:schemeClr val="accent1"/>
+            </a:effectRef>
+            <a:fontRef idx="minor">
+              <a:schemeClr val="lt1"/>
+            </a:fontRef>
+          </p:style>
+          <p:txBody>
+            <a:bodyPr rtlCol="0" anchor="ctr"/>
+            <a:lstStyle/>
+            <a:p>
+              <a:pPr algn="ctr"/>
+              <a:endParaRPr lang="en-US"/>
+            </a:p>
+          </p:txBody>
+        </p:sp>
+        <p:cxnSp>
+          <p:nvCxnSpPr>
+            <p:cNvPr id="28" name="Straight Arrow Connector 27"/>
+            <p:cNvCxnSpPr/>
+            <p:nvPr/>
+          </p:nvCxnSpPr>
+          <p:spPr>
+            <a:xfrm rot="11036339" flipH="1">
+              <a:off x="3737000" y="4635624"/>
+              <a:ext cx="317575" cy="403437"/>
+            </a:xfrm>
+            <a:prstGeom prst="straightConnector1">
+              <a:avLst/>
+            </a:prstGeom>
+            <a:ln>
+              <a:solidFill>
+                <a:srgbClr val="FF0000"/>
+              </a:solidFill>
+              <a:tailEnd type="arrow"/>
+            </a:ln>
+          </p:spPr>
+          <p:style>
+            <a:lnRef idx="1">
+              <a:schemeClr val="accent1"/>
+            </a:lnRef>
+            <a:fillRef idx="0">
+              <a:schemeClr val="accent1"/>
+            </a:fillRef>
+            <a:effectRef idx="0">
+              <a:schemeClr val="accent1"/>
+            </a:effectRef>
+            <a:fontRef idx="minor">
+              <a:schemeClr val="tx1"/>
+            </a:fontRef>
+          </p:style>
+        </p:cxnSp>
+      </p:grpSp>
+      <p:grpSp>
+        <p:nvGrpSpPr>
+          <p:cNvPr id="3" name="Group 2"/>
+          <p:cNvGrpSpPr/>
+          <p:nvPr/>
+        </p:nvGrpSpPr>
+        <p:grpSpPr>
+          <a:xfrm rot="13829149">
+            <a:off x="1741739" y="4387576"/>
+            <a:ext cx="358395" cy="581644"/>
+            <a:chOff x="1981199" y="4790456"/>
+            <a:chExt cx="358395" cy="581644"/>
+          </a:xfrm>
+        </p:grpSpPr>
+        <p:sp>
+          <p:nvSpPr>
+            <p:cNvPr id="7" name="Rectangle 6"/>
+            <p:cNvSpPr/>
+            <p:nvPr/>
+          </p:nvSpPr>
+          <p:spPr>
+            <a:xfrm rot="2398792">
+              <a:off x="1981199" y="4991100"/>
+              <a:ext cx="152400" cy="381000"/>
+            </a:xfrm>
+            <a:prstGeom prst="rect">
+              <a:avLst/>
+            </a:prstGeom>
+            <a:solidFill>
+              <a:srgbClr val="FFC000"/>
+            </a:solidFill>
+          </p:spPr>
+          <p:style>
+            <a:lnRef idx="2">
+              <a:schemeClr val="accent1">
+                <a:shade val="50000"/>
+              </a:schemeClr>
+            </a:lnRef>
+            <a:fillRef idx="1">
+              <a:schemeClr val="accent1"/>
+            </a:fillRef>
+            <a:effectRef idx="0">
+              <a:schemeClr val="accent1"/>
+            </a:effectRef>
+            <a:fontRef idx="minor">
+              <a:schemeClr val="lt1"/>
+            </a:fontRef>
+          </p:style>
+          <p:txBody>
+            <a:bodyPr rtlCol="0" anchor="ctr"/>
+            <a:lstStyle/>
+            <a:p>
+              <a:pPr algn="ctr"/>
+              <a:endParaRPr lang="en-US" dirty="0"/>
+            </a:p>
+          </p:txBody>
+        </p:sp>
+        <p:cxnSp>
+          <p:nvCxnSpPr>
+            <p:cNvPr id="29" name="Straight Arrow Connector 28"/>
+            <p:cNvCxnSpPr/>
+            <p:nvPr/>
+          </p:nvCxnSpPr>
+          <p:spPr>
+            <a:xfrm flipV="1">
+              <a:off x="2159763" y="4790456"/>
+              <a:ext cx="179831" cy="237220"/>
+            </a:xfrm>
+            <a:prstGeom prst="straightConnector1">
+              <a:avLst/>
+            </a:prstGeom>
+            <a:ln>
+              <a:solidFill>
+                <a:srgbClr val="FF0000"/>
+              </a:solidFill>
+              <a:tailEnd type="arrow"/>
+            </a:ln>
+          </p:spPr>
+          <p:style>
+            <a:lnRef idx="1">
+              <a:schemeClr val="accent1"/>
+            </a:lnRef>
+            <a:fillRef idx="0">
+              <a:schemeClr val="accent1"/>
+            </a:fillRef>
+            <a:effectRef idx="0">
+              <a:schemeClr val="accent1"/>
+            </a:effectRef>
+            <a:fontRef idx="minor">
+              <a:schemeClr val="tx1"/>
+            </a:fontRef>
+          </p:style>
+        </p:cxnSp>
+      </p:grpSp>
+      <p:sp>
+        <p:nvSpPr>
+          <p:cNvPr id="94" name="Oval 93"/>
+          <p:cNvSpPr/>
+          <p:nvPr/>
+        </p:nvSpPr>
+        <p:spPr>
+          <a:xfrm>
+            <a:off x="1985118" y="3059956"/>
+            <a:ext cx="208224" cy="209673"/>
+          </a:xfrm>
+          <a:prstGeom prst="ellipse">
+            <a:avLst/>
+          </a:prstGeom>
+          <a:solidFill>
+            <a:srgbClr val="92D050"/>
+          </a:solidFill>
+        </p:spPr>
+        <p:style>
+          <a:lnRef idx="2">
+            <a:schemeClr val="accent1">
+              <a:shade val="50000"/>
+            </a:schemeClr>
+          </a:lnRef>
+          <a:fillRef idx="1">
+            <a:schemeClr val="accent1"/>
+          </a:fillRef>
+          <a:effectRef idx="0">
+            <a:schemeClr val="accent1"/>
+          </a:effectRef>
+          <a:fontRef idx="minor">
+            <a:schemeClr val="lt1"/>
+          </a:fontRef>
+        </p:style>
+        <p:txBody>
+          <a:bodyPr rtlCol="0" anchor="ctr"/>
+          <a:lstStyle/>
+          <a:p>
+            <a:pPr algn="ctr"/>
+            <a:endParaRPr lang="en-US"/>
+          </a:p>
+        </p:txBody>
+      </p:sp>
+      <mc:AlternateContent xmlns:mc="http://schemas.openxmlformats.org/markup-compatibility/2006">
+        <mc:Choice xmlns:a14="http://schemas.microsoft.com/office/drawing/2010/main" Requires="a14">
+          <p:sp>
+            <p:nvSpPr>
+              <p:cNvPr id="96" name="Rectangle 95"/>
+              <p:cNvSpPr/>
+              <p:nvPr/>
+            </p:nvSpPr>
+            <p:spPr>
+              <a:xfrm>
+                <a:off x="4191000" y="3354869"/>
+                <a:ext cx="1138710" cy="369332"/>
+              </a:xfrm>
+              <a:prstGeom prst="rect">
+                <a:avLst/>
+              </a:prstGeom>
+            </p:spPr>
+            <p:txBody>
+              <a:bodyPr wrap="none">
+                <a:spAutoFit/>
+              </a:bodyPr>
+              <a:lstStyle/>
+              <a:p>
+                <a:pPr/>
+                <a:r>
+                  <a:rPr lang="en-US" dirty="0" smtClean="0">
+                    <a:solidFill>
+                      <a:srgbClr val="FFC000"/>
+                    </a:solidFill>
+                  </a:rPr>
+                  <a:t>V3 = r3*</a:t>
+                </a:r>
+                <a14:m>
+                  <m:oMath xmlns:m="http://schemas.openxmlformats.org/officeDocument/2006/math">
+                    <m:r>
+                      <a:rPr lang="en-US" i="1" smtClean="0">
+                        <a:solidFill>
+                          <a:srgbClr val="FFC000"/>
+                        </a:solidFill>
+                        <a:latin typeface="Cambria Math"/>
+                      </a:rPr>
+                      <m:t>𝜔</m:t>
+                    </m:r>
+                  </m:oMath>
+                </a14:m>
+                <a:endParaRPr lang="en-US" dirty="0">
+                  <a:solidFill>
+                    <a:srgbClr val="FFC000"/>
+                  </a:solidFill>
+                </a:endParaRPr>
+              </a:p>
+            </p:txBody>
+          </p:sp>
+        </mc:Choice>
+        <mc:Fallback>
+          <p:sp>
+            <p:nvSpPr>
+              <p:cNvPr id="96" name="Rectangle 95"/>
+              <p:cNvSpPr>
+                <a:spLocks noRot="1" noChangeAspect="1" noMove="1" noResize="1" noEditPoints="1" noAdjustHandles="1" noChangeArrowheads="1" noChangeShapeType="1" noTextEdit="1"/>
+              </p:cNvSpPr>
+              <p:nvPr/>
+            </p:nvSpPr>
+            <p:spPr>
+              <a:xfrm>
+                <a:off x="4191000" y="3354869"/>
+                <a:ext cx="1138710" cy="369332"/>
+              </a:xfrm>
+              <a:prstGeom prst="rect">
+                <a:avLst/>
+              </a:prstGeom>
+              <a:blipFill rotWithShape="1">
+                <a:blip r:embed="rId2"/>
+                <a:stretch>
+                  <a:fillRect l="-4839" t="-8197" b="-24590"/>
+                </a:stretch>
+              </a:blipFill>
+            </p:spPr>
+            <p:txBody>
+              <a:bodyPr/>
+              <a:lstStyle/>
+              <a:p>
+                <a:r>
+                  <a:rPr lang="en-US">
+                    <a:noFill/>
+                  </a:rPr>
+                  <a:t> </a:t>
+                </a:r>
+              </a:p>
+            </p:txBody>
+          </p:sp>
+        </mc:Fallback>
+      </mc:AlternateContent>
+      <p:sp>
+        <p:nvSpPr>
+          <p:cNvPr id="14" name="Arc 13"/>
+          <p:cNvSpPr/>
+          <p:nvPr/>
+        </p:nvSpPr>
+        <p:spPr>
+          <a:xfrm rot="8914180">
+            <a:off x="4613346" y="1007255"/>
+            <a:ext cx="2146037" cy="1931437"/>
+          </a:xfrm>
+          <a:prstGeom prst="arc">
+            <a:avLst>
+              <a:gd name="adj1" fmla="val 11768176"/>
+              <a:gd name="adj2" fmla="val 0"/>
+            </a:avLst>
+          </a:prstGeom>
+          <a:ln w="76200">
+            <a:solidFill>
+              <a:srgbClr val="FF0000"/>
+            </a:solidFill>
+            <a:headEnd type="none" w="med" len="med"/>
+            <a:tailEnd type="arrow" w="med" len="med"/>
+          </a:ln>
+        </p:spPr>
+        <p:style>
+          <a:lnRef idx="1">
+            <a:schemeClr val="accent1"/>
+          </a:lnRef>
+          <a:fillRef idx="0">
+            <a:schemeClr val="accent1"/>
+          </a:fillRef>
+          <a:effectRef idx="0">
+            <a:schemeClr val="accent1"/>
+          </a:effectRef>
+          <a:fontRef idx="minor">
+            <a:schemeClr val="tx1"/>
+          </a:fontRef>
+        </p:style>
+        <p:txBody>
+          <a:bodyPr rtlCol="0" anchor="ctr"/>
+          <a:lstStyle/>
+          <a:p>
+            <a:pPr algn="ctr"/>
+            <a:endParaRPr lang="en-US"/>
+          </a:p>
+        </p:txBody>
+      </p:sp>
+      <p:sp>
+        <p:nvSpPr>
+          <p:cNvPr id="18" name="Oval 17"/>
+          <p:cNvSpPr/>
+          <p:nvPr/>
+        </p:nvSpPr>
+        <p:spPr>
+          <a:xfrm>
+            <a:off x="666597" y="1776237"/>
+            <a:ext cx="2848326" cy="2848326"/>
+          </a:xfrm>
+          <a:prstGeom prst="ellipse">
+            <a:avLst/>
+          </a:prstGeom>
+          <a:noFill/>
+          <a:ln>
+            <a:solidFill>
+              <a:srgbClr val="FFC000"/>
+            </a:solidFill>
+          </a:ln>
+        </p:spPr>
+        <p:style>
+          <a:lnRef idx="2">
+            <a:schemeClr val="accent1">
+              <a:shade val="50000"/>
+            </a:schemeClr>
+          </a:lnRef>
+          <a:fillRef idx="1">
+            <a:schemeClr val="accent1"/>
+          </a:fillRef>
+          <a:effectRef idx="0">
+            <a:schemeClr val="accent1"/>
+          </a:effectRef>
+          <a:fontRef idx="minor">
+            <a:schemeClr val="lt1"/>
+          </a:fontRef>
+        </p:style>
+        <p:txBody>
+          <a:bodyPr rtlCol="0" anchor="ctr"/>
+          <a:lstStyle/>
+          <a:p>
+            <a:pPr algn="ctr"/>
+            <a:endParaRPr lang="en-US"/>
+          </a:p>
+        </p:txBody>
+      </p:sp>
+      <p:sp>
+        <p:nvSpPr>
+          <p:cNvPr id="55" name="Oval 54"/>
+          <p:cNvSpPr/>
+          <p:nvPr/>
+        </p:nvSpPr>
+        <p:spPr>
+          <a:xfrm>
+            <a:off x="285597" y="1395237"/>
+            <a:ext cx="3610326" cy="3610326"/>
+          </a:xfrm>
+          <a:prstGeom prst="ellipse">
+            <a:avLst/>
+          </a:prstGeom>
+          <a:noFill/>
+          <a:ln>
+            <a:solidFill>
+              <a:srgbClr val="FFC000"/>
+            </a:solidFill>
+          </a:ln>
+        </p:spPr>
+        <p:style>
+          <a:lnRef idx="2">
+            <a:schemeClr val="accent1">
+              <a:shade val="50000"/>
+            </a:schemeClr>
+          </a:lnRef>
+          <a:fillRef idx="1">
+            <a:schemeClr val="accent1"/>
+          </a:fillRef>
+          <a:effectRef idx="0">
+            <a:schemeClr val="accent1"/>
+          </a:effectRef>
+          <a:fontRef idx="minor">
+            <a:schemeClr val="lt1"/>
+          </a:fontRef>
+        </p:style>
+        <p:txBody>
+          <a:bodyPr rtlCol="0" anchor="ctr"/>
+          <a:lstStyle/>
+          <a:p>
+            <a:pPr algn="ctr"/>
+            <a:endParaRPr lang="en-US"/>
+          </a:p>
+        </p:txBody>
+      </p:sp>
+      <p:cxnSp>
+        <p:nvCxnSpPr>
+          <p:cNvPr id="57" name="Straight Arrow Connector 56"/>
+          <p:cNvCxnSpPr/>
+          <p:nvPr/>
+        </p:nvCxnSpPr>
+        <p:spPr>
+          <a:xfrm>
+            <a:off x="3586223" y="3356535"/>
+            <a:ext cx="0" cy="290642"/>
+          </a:xfrm>
+          <a:prstGeom prst="straightConnector1">
+            <a:avLst/>
+          </a:prstGeom>
+          <a:ln>
+            <a:solidFill>
+              <a:srgbClr val="FF0000"/>
+            </a:solidFill>
+            <a:tailEnd type="arrow"/>
+          </a:ln>
+        </p:spPr>
+        <p:style>
+          <a:lnRef idx="1">
+            <a:schemeClr val="accent1"/>
+          </a:lnRef>
+          <a:fillRef idx="0">
+            <a:schemeClr val="accent1"/>
+          </a:fillRef>
+          <a:effectRef idx="0">
+            <a:schemeClr val="accent1"/>
+          </a:effectRef>
+          <a:fontRef idx="minor">
+            <a:schemeClr val="tx1"/>
+          </a:fontRef>
+        </p:style>
+      </p:cxnSp>
+      <p:cxnSp>
+        <p:nvCxnSpPr>
+          <p:cNvPr id="24" name="Straight Connector 23"/>
+          <p:cNvCxnSpPr>
+            <a:endCxn id="8" idx="3"/>
+          </p:cNvCxnSpPr>
+          <p:nvPr/>
+        </p:nvCxnSpPr>
+        <p:spPr>
+          <a:xfrm>
+            <a:off x="2068275" y="3200400"/>
+            <a:ext cx="1445300" cy="1452247"/>
+          </a:xfrm>
+          <a:prstGeom prst="line">
+            <a:avLst/>
+          </a:prstGeom>
+          <a:ln>
+            <a:solidFill>
+              <a:srgbClr val="FFC000"/>
+            </a:solidFill>
+          </a:ln>
+        </p:spPr>
+        <p:style>
+          <a:lnRef idx="1">
+            <a:schemeClr val="accent1"/>
+          </a:lnRef>
+          <a:fillRef idx="0">
+            <a:schemeClr val="accent1"/>
+          </a:fillRef>
+          <a:effectRef idx="0">
+            <a:schemeClr val="accent1"/>
+          </a:effectRef>
+          <a:fontRef idx="minor">
+            <a:schemeClr val="tx1"/>
+          </a:fontRef>
+        </p:style>
+      </p:cxnSp>
+      <p:cxnSp>
+        <p:nvCxnSpPr>
+          <p:cNvPr id="62" name="Straight Connector 61"/>
+          <p:cNvCxnSpPr/>
+          <p:nvPr/>
+        </p:nvCxnSpPr>
+        <p:spPr>
+          <a:xfrm>
+            <a:off x="2071868" y="3198471"/>
+            <a:ext cx="1433331" cy="1929"/>
+          </a:xfrm>
+          <a:prstGeom prst="line">
+            <a:avLst/>
+          </a:prstGeom>
+          <a:ln>
+            <a:solidFill>
+              <a:srgbClr val="FFC000"/>
+            </a:solidFill>
+          </a:ln>
+        </p:spPr>
+        <p:style>
+          <a:lnRef idx="1">
+            <a:schemeClr val="accent1"/>
+          </a:lnRef>
+          <a:fillRef idx="0">
+            <a:schemeClr val="accent1"/>
+          </a:fillRef>
+          <a:effectRef idx="0">
+            <a:schemeClr val="accent1"/>
+          </a:effectRef>
+          <a:fontRef idx="minor">
+            <a:schemeClr val="tx1"/>
+          </a:fontRef>
+        </p:style>
+      </p:cxnSp>
+      <p:cxnSp>
+        <p:nvCxnSpPr>
+          <p:cNvPr id="65" name="Straight Connector 64"/>
+          <p:cNvCxnSpPr/>
+          <p:nvPr/>
+        </p:nvCxnSpPr>
+        <p:spPr>
+          <a:xfrm flipH="1">
+            <a:off x="2083443" y="3198471"/>
+            <a:ext cx="11575" cy="1469985"/>
+          </a:xfrm>
+          <a:prstGeom prst="line">
+            <a:avLst/>
+          </a:prstGeom>
+          <a:ln>
+            <a:solidFill>
+              <a:srgbClr val="FFC000"/>
+            </a:solidFill>
+          </a:ln>
+        </p:spPr>
+        <p:style>
+          <a:lnRef idx="1">
+            <a:schemeClr val="accent1"/>
+          </a:lnRef>
+          <a:fillRef idx="0">
+            <a:schemeClr val="accent1"/>
+          </a:fillRef>
+          <a:effectRef idx="0">
+            <a:schemeClr val="accent1"/>
+          </a:effectRef>
+          <a:fontRef idx="minor">
+            <a:schemeClr val="tx1"/>
+          </a:fontRef>
+        </p:style>
+      </p:cxnSp>
+      <p:sp>
+        <p:nvSpPr>
+          <p:cNvPr id="33" name="TextBox 32"/>
+          <p:cNvSpPr txBox="1"/>
+          <p:nvPr/>
+        </p:nvSpPr>
+        <p:spPr>
+          <a:xfrm>
+            <a:off x="3513575" y="5257800"/>
+            <a:ext cx="535724" cy="369332"/>
+          </a:xfrm>
+          <a:prstGeom prst="rect">
+            <a:avLst/>
+          </a:prstGeom>
+          <a:noFill/>
+        </p:spPr>
+        <p:txBody>
+          <a:bodyPr wrap="none" rtlCol="0">
+            <a:spAutoFit/>
+          </a:bodyPr>
+          <a:lstStyle/>
+          <a:p>
+            <a:r>
+              <a:rPr lang="en-US" dirty="0" smtClean="0"/>
+              <a:t>P=1</a:t>
+            </a:r>
+            <a:endParaRPr lang="en-US" dirty="0"/>
+          </a:p>
+        </p:txBody>
+      </p:sp>
+      <p:sp>
+        <p:nvSpPr>
+          <p:cNvPr id="69" name="Rectangle 68"/>
+          <p:cNvSpPr/>
+          <p:nvPr/>
+        </p:nvSpPr>
+        <p:spPr>
+          <a:xfrm>
+            <a:off x="4165922" y="3937819"/>
+            <a:ext cx="1502334" cy="369332"/>
+          </a:xfrm>
+          <a:prstGeom prst="rect">
+            <a:avLst/>
+          </a:prstGeom>
+        </p:spPr>
+        <p:txBody>
+          <a:bodyPr wrap="none">
+            <a:spAutoFit/>
+          </a:bodyPr>
+          <a:lstStyle/>
+          <a:p>
+            <a:pPr/>
+            <a:r>
+              <a:rPr lang="en-US" dirty="0" smtClean="0">
+                <a:solidFill>
+                  <a:srgbClr val="FFC000"/>
+                </a:solidFill>
+              </a:rPr>
+              <a:t>V2 = V3*r2/r3</a:t>
+            </a:r>
+            <a:endParaRPr lang="en-US" dirty="0">
+              <a:solidFill>
+                <a:srgbClr val="FFC000"/>
+              </a:solidFill>
+            </a:endParaRPr>
+          </a:p>
+        </p:txBody>
+      </p:sp>
+      <p:sp>
+        <p:nvSpPr>
+          <p:cNvPr id="71" name="Rectangle 70"/>
+          <p:cNvSpPr/>
+          <p:nvPr/>
+        </p:nvSpPr>
+        <p:spPr>
+          <a:xfrm>
+            <a:off x="4318322" y="4330287"/>
+            <a:ext cx="1422184" cy="369332"/>
+          </a:xfrm>
+          <a:prstGeom prst="rect">
+            <a:avLst/>
+          </a:prstGeom>
+        </p:spPr>
+        <p:txBody>
+          <a:bodyPr wrap="none">
+            <a:spAutoFit/>
+          </a:bodyPr>
+          <a:lstStyle/>
+          <a:p>
+            <a:pPr/>
+            <a:r>
+              <a:rPr lang="en-US" dirty="0" smtClean="0">
+                <a:solidFill>
+                  <a:srgbClr val="FFC000"/>
+                </a:solidFill>
+              </a:rPr>
+              <a:t>V1 = V3*0/r3</a:t>
+            </a:r>
+            <a:endParaRPr lang="en-US" dirty="0">
+              <a:solidFill>
+                <a:srgbClr val="FFC000"/>
+              </a:solidFill>
+            </a:endParaRPr>
+          </a:p>
+        </p:txBody>
+      </p:sp>
+      <p:sp>
+        <p:nvSpPr>
+          <p:cNvPr id="76" name="Rectangle 75"/>
+          <p:cNvSpPr/>
+          <p:nvPr/>
+        </p:nvSpPr>
+        <p:spPr>
+          <a:xfrm>
+            <a:off x="3415436" y="4502645"/>
+            <a:ext cx="1066800" cy="911973"/>
+          </a:xfrm>
+          <a:prstGeom prst="rect">
+            <a:avLst/>
+          </a:prstGeom>
+          <a:solidFill>
+            <a:srgbClr val="FF0000"/>
+          </a:solidFill>
+        </p:spPr>
+        <p:style>
+          <a:lnRef idx="2">
+            <a:schemeClr val="accent1">
+              <a:shade val="50000"/>
+            </a:schemeClr>
+          </a:lnRef>
+          <a:fillRef idx="1">
+            <a:schemeClr val="accent1"/>
+          </a:fillRef>
+          <a:effectRef idx="0">
+            <a:schemeClr val="accent1"/>
+          </a:effectRef>
+          <a:fontRef idx="minor">
+            <a:schemeClr val="lt1"/>
+          </a:fontRef>
+        </p:style>
+        <p:txBody>
+          <a:bodyPr rtlCol="0" anchor="ctr"/>
+          <a:lstStyle/>
+          <a:p>
+            <a:pPr algn="ctr"/>
+            <a:endParaRPr lang="en-US" dirty="0"/>
+          </a:p>
+        </p:txBody>
+      </p:sp>
+    </p:spTree>
+    <p:extLst>
+      <p:ext uri="{BB962C8B-B14F-4D97-AF65-F5344CB8AC3E}">
+        <p14:creationId xmlns:p14="http://schemas.microsoft.com/office/powerpoint/2010/main" val="4072542635"/>
       </p:ext>
     </p:extLst>
   </p:cSld>

</xml_diff>